<commit_message>
Updated aviation presentation and Jupyter notebook
</commit_message>
<xml_diff>
--- a/aviation presentation.pptx
+++ b/aviation presentation.pptx
@@ -112,6 +112,11 @@
       </a:defRPr>
     </a:lvl9pPr>
   </p:defaultTextStyle>
+  <p:extLst>
+    <p:ext uri="{EFAFB233-063F-42B5-8137-9DF3F51BA10A}">
+      <p15:sldGuideLst xmlns:p15="http://schemas.microsoft.com/office/powerpoint/2012/main"/>
+    </p:ext>
+  </p:extLst>
 </p:presentation>
 </file>
 
@@ -291,7 +296,7 @@
           <a:p>
             <a:fld id="{34665F90-0536-4DD0-96DA-CDEC1864F8DD}" type="datetimeFigureOut">
               <a:rPr lang="en-KE" smtClean="0"/>
-              <a:t>07/09/2024</a:t>
+              <a:t>09/09/2024</a:t>
             </a:fld>
             <a:endParaRPr lang="en-KE"/>
           </a:p>
@@ -461,7 +466,7 @@
           <a:p>
             <a:fld id="{34665F90-0536-4DD0-96DA-CDEC1864F8DD}" type="datetimeFigureOut">
               <a:rPr lang="en-KE" smtClean="0"/>
-              <a:t>07/09/2024</a:t>
+              <a:t>09/09/2024</a:t>
             </a:fld>
             <a:endParaRPr lang="en-KE"/>
           </a:p>
@@ -684,7 +689,7 @@
           <a:p>
             <a:fld id="{34665F90-0536-4DD0-96DA-CDEC1864F8DD}" type="datetimeFigureOut">
               <a:rPr lang="en-KE" smtClean="0"/>
-              <a:t>07/09/2024</a:t>
+              <a:t>09/09/2024</a:t>
             </a:fld>
             <a:endParaRPr lang="en-KE"/>
           </a:p>
@@ -864,7 +869,7 @@
           <a:p>
             <a:fld id="{34665F90-0536-4DD0-96DA-CDEC1864F8DD}" type="datetimeFigureOut">
               <a:rPr lang="en-KE" smtClean="0"/>
-              <a:t>07/09/2024</a:t>
+              <a:t>09/09/2024</a:t>
             </a:fld>
             <a:endParaRPr lang="en-KE"/>
           </a:p>
@@ -1170,7 +1175,7 @@
           <a:p>
             <a:fld id="{34665F90-0536-4DD0-96DA-CDEC1864F8DD}" type="datetimeFigureOut">
               <a:rPr lang="en-KE" smtClean="0"/>
-              <a:t>07/09/2024</a:t>
+              <a:t>09/09/2024</a:t>
             </a:fld>
             <a:endParaRPr lang="en-KE"/>
           </a:p>
@@ -1474,7 +1479,7 @@
           <a:p>
             <a:fld id="{34665F90-0536-4DD0-96DA-CDEC1864F8DD}" type="datetimeFigureOut">
               <a:rPr lang="en-KE" smtClean="0"/>
-              <a:t>07/09/2024</a:t>
+              <a:t>09/09/2024</a:t>
             </a:fld>
             <a:endParaRPr lang="en-KE"/>
           </a:p>
@@ -1896,7 +1901,7 @@
           <a:p>
             <a:fld id="{34665F90-0536-4DD0-96DA-CDEC1864F8DD}" type="datetimeFigureOut">
               <a:rPr lang="en-KE" smtClean="0"/>
-              <a:t>07/09/2024</a:t>
+              <a:t>09/09/2024</a:t>
             </a:fld>
             <a:endParaRPr lang="en-KE"/>
           </a:p>
@@ -2014,7 +2019,7 @@
           <a:p>
             <a:fld id="{34665F90-0536-4DD0-96DA-CDEC1864F8DD}" type="datetimeFigureOut">
               <a:rPr lang="en-KE" smtClean="0"/>
-              <a:t>07/09/2024</a:t>
+              <a:t>09/09/2024</a:t>
             </a:fld>
             <a:endParaRPr lang="en-KE"/>
           </a:p>
@@ -2109,7 +2114,7 @@
           <a:p>
             <a:fld id="{34665F90-0536-4DD0-96DA-CDEC1864F8DD}" type="datetimeFigureOut">
               <a:rPr lang="en-KE" smtClean="0"/>
-              <a:t>07/09/2024</a:t>
+              <a:t>09/09/2024</a:t>
             </a:fld>
             <a:endParaRPr lang="en-KE"/>
           </a:p>
@@ -2382,7 +2387,7 @@
           <a:p>
             <a:fld id="{34665F90-0536-4DD0-96DA-CDEC1864F8DD}" type="datetimeFigureOut">
               <a:rPr lang="en-KE" smtClean="0"/>
-              <a:t>07/09/2024</a:t>
+              <a:t>09/09/2024</a:t>
             </a:fld>
             <a:endParaRPr lang="en-KE"/>
           </a:p>
@@ -2647,7 +2652,7 @@
           <a:p>
             <a:fld id="{34665F90-0536-4DD0-96DA-CDEC1864F8DD}" type="datetimeFigureOut">
               <a:rPr lang="en-KE" smtClean="0"/>
-              <a:t>07/09/2024</a:t>
+              <a:t>09/09/2024</a:t>
             </a:fld>
             <a:endParaRPr lang="en-KE"/>
           </a:p>
@@ -2896,7 +2901,7 @@
           <a:p>
             <a:fld id="{34665F90-0536-4DD0-96DA-CDEC1864F8DD}" type="datetimeFigureOut">
               <a:rPr lang="en-KE" smtClean="0"/>
-              <a:t>07/09/2024</a:t>
+              <a:t>09/09/2024</a:t>
             </a:fld>
             <a:endParaRPr lang="en-KE"/>
           </a:p>

</xml_diff>